<commit_message>
Added AC Voltage regulators lecture
Updated Gate Drive design doc
</commit_message>
<xml_diff>
--- a/Gate Drive Design.pptx
+++ b/Gate Drive Design.pptx
@@ -11,6 +11,15 @@
     <p:sldId id="259" r:id="rId5"/>
     <p:sldId id="261" r:id="rId6"/>
     <p:sldId id="260" r:id="rId7"/>
+    <p:sldId id="262" r:id="rId8"/>
+    <p:sldId id="263" r:id="rId9"/>
+    <p:sldId id="264" r:id="rId10"/>
+    <p:sldId id="266" r:id="rId11"/>
+    <p:sldId id="267" r:id="rId12"/>
+    <p:sldId id="268" r:id="rId13"/>
+    <p:sldId id="269" r:id="rId14"/>
+    <p:sldId id="270" r:id="rId15"/>
+    <p:sldId id="271" r:id="rId16"/>
   </p:sldIdLst>
   <p:sldSz cx="12192000" cy="6858000"/>
   <p:notesSz cx="6858000" cy="9144000"/>
@@ -109,6 +118,11 @@
       </a:defRPr>
     </a:lvl9pPr>
   </p:defaultTextStyle>
+  <p:extLst>
+    <p:ext uri="{EFAFB233-063F-42B5-8137-9DF3F51BA10A}">
+      <p15:sldGuideLst xmlns:p15="http://schemas.microsoft.com/office/powerpoint/2012/main"/>
+    </p:ext>
+  </p:extLst>
 </p:presentation>
 </file>
 
@@ -259,7 +273,7 @@
           <a:p>
             <a:fld id="{5E02EC6E-AFD3-4B22-A10D-4BBDBB9765FA}" type="datetimeFigureOut">
               <a:rPr lang="en-US" smtClean="0"/>
-              <a:t>3/28/2019</a:t>
+              <a:t>4/3/2019</a:t>
             </a:fld>
             <a:endParaRPr lang="en-US"/>
           </a:p>
@@ -457,7 +471,7 @@
           <a:p>
             <a:fld id="{5E02EC6E-AFD3-4B22-A10D-4BBDBB9765FA}" type="datetimeFigureOut">
               <a:rPr lang="en-US" smtClean="0"/>
-              <a:t>3/28/2019</a:t>
+              <a:t>4/3/2019</a:t>
             </a:fld>
             <a:endParaRPr lang="en-US"/>
           </a:p>
@@ -665,7 +679,7 @@
           <a:p>
             <a:fld id="{5E02EC6E-AFD3-4B22-A10D-4BBDBB9765FA}" type="datetimeFigureOut">
               <a:rPr lang="en-US" smtClean="0"/>
-              <a:t>3/28/2019</a:t>
+              <a:t>4/3/2019</a:t>
             </a:fld>
             <a:endParaRPr lang="en-US"/>
           </a:p>
@@ -863,7 +877,7 @@
           <a:p>
             <a:fld id="{5E02EC6E-AFD3-4B22-A10D-4BBDBB9765FA}" type="datetimeFigureOut">
               <a:rPr lang="en-US" smtClean="0"/>
-              <a:t>3/28/2019</a:t>
+              <a:t>4/3/2019</a:t>
             </a:fld>
             <a:endParaRPr lang="en-US"/>
           </a:p>
@@ -1138,7 +1152,7 @@
           <a:p>
             <a:fld id="{5E02EC6E-AFD3-4B22-A10D-4BBDBB9765FA}" type="datetimeFigureOut">
               <a:rPr lang="en-US" smtClean="0"/>
-              <a:t>3/28/2019</a:t>
+              <a:t>4/3/2019</a:t>
             </a:fld>
             <a:endParaRPr lang="en-US"/>
           </a:p>
@@ -1403,7 +1417,7 @@
           <a:p>
             <a:fld id="{5E02EC6E-AFD3-4B22-A10D-4BBDBB9765FA}" type="datetimeFigureOut">
               <a:rPr lang="en-US" smtClean="0"/>
-              <a:t>3/28/2019</a:t>
+              <a:t>4/3/2019</a:t>
             </a:fld>
             <a:endParaRPr lang="en-US"/>
           </a:p>
@@ -1815,7 +1829,7 @@
           <a:p>
             <a:fld id="{5E02EC6E-AFD3-4B22-A10D-4BBDBB9765FA}" type="datetimeFigureOut">
               <a:rPr lang="en-US" smtClean="0"/>
-              <a:t>3/28/2019</a:t>
+              <a:t>4/3/2019</a:t>
             </a:fld>
             <a:endParaRPr lang="en-US"/>
           </a:p>
@@ -1956,7 +1970,7 @@
           <a:p>
             <a:fld id="{5E02EC6E-AFD3-4B22-A10D-4BBDBB9765FA}" type="datetimeFigureOut">
               <a:rPr lang="en-US" smtClean="0"/>
-              <a:t>3/28/2019</a:t>
+              <a:t>4/3/2019</a:t>
             </a:fld>
             <a:endParaRPr lang="en-US"/>
           </a:p>
@@ -2069,7 +2083,7 @@
           <a:p>
             <a:fld id="{5E02EC6E-AFD3-4B22-A10D-4BBDBB9765FA}" type="datetimeFigureOut">
               <a:rPr lang="en-US" smtClean="0"/>
-              <a:t>3/28/2019</a:t>
+              <a:t>4/3/2019</a:t>
             </a:fld>
             <a:endParaRPr lang="en-US"/>
           </a:p>
@@ -2380,7 +2394,7 @@
           <a:p>
             <a:fld id="{5E02EC6E-AFD3-4B22-A10D-4BBDBB9765FA}" type="datetimeFigureOut">
               <a:rPr lang="en-US" smtClean="0"/>
-              <a:t>3/28/2019</a:t>
+              <a:t>4/3/2019</a:t>
             </a:fld>
             <a:endParaRPr lang="en-US"/>
           </a:p>
@@ -2668,7 +2682,7 @@
           <a:p>
             <a:fld id="{5E02EC6E-AFD3-4B22-A10D-4BBDBB9765FA}" type="datetimeFigureOut">
               <a:rPr lang="en-US" smtClean="0"/>
-              <a:t>3/28/2019</a:t>
+              <a:t>4/3/2019</a:t>
             </a:fld>
             <a:endParaRPr lang="en-US"/>
           </a:p>
@@ -2909,7 +2923,7 @@
           <a:p>
             <a:fld id="{5E02EC6E-AFD3-4B22-A10D-4BBDBB9765FA}" type="datetimeFigureOut">
               <a:rPr lang="en-US" smtClean="0"/>
-              <a:t>3/28/2019</a:t>
+              <a:t>4/3/2019</a:t>
             </a:fld>
             <a:endParaRPr lang="en-US"/>
           </a:p>
@@ -3572,6 +3586,934 @@
 </p:sld>
 </file>
 
+<file path=ppt/slides/slide10.xml><?xml version="1.0" encoding="utf-8"?>
+<p:sld xmlns:a="http://schemas.openxmlformats.org/drawingml/2006/main" xmlns:r="http://schemas.openxmlformats.org/officeDocument/2006/relationships" xmlns:p="http://schemas.openxmlformats.org/presentationml/2006/main">
+  <p:cSld>
+    <p:spTree>
+      <p:nvGrpSpPr>
+        <p:cNvPr id="1" name=""/>
+        <p:cNvGrpSpPr/>
+        <p:nvPr/>
+      </p:nvGrpSpPr>
+      <p:grpSpPr>
+        <a:xfrm>
+          <a:off x="0" y="0"/>
+          <a:ext cx="0" cy="0"/>
+          <a:chOff x="0" y="0"/>
+          <a:chExt cx="0" cy="0"/>
+        </a:xfrm>
+      </p:grpSpPr>
+      <p:sp>
+        <p:nvSpPr>
+          <p:cNvPr id="3" name="Content Placeholder 2">
+            <a:extLst>
+              <a:ext uri="{FF2B5EF4-FFF2-40B4-BE49-F238E27FC236}">
+                <a16:creationId xmlns:a16="http://schemas.microsoft.com/office/drawing/2014/main" id="{F7D57EB4-03F4-48DA-9B5D-2683D5BA1784}"/>
+              </a:ext>
+            </a:extLst>
+          </p:cNvPr>
+          <p:cNvSpPr>
+            <a:spLocks noGrp="1"/>
+          </p:cNvSpPr>
+          <p:nvPr>
+            <p:ph idx="1"/>
+          </p:nvPr>
+        </p:nvSpPr>
+        <p:spPr>
+          <a:xfrm>
+            <a:off x="570216" y="926635"/>
+            <a:ext cx="11106363" cy="5515261"/>
+          </a:xfrm>
+        </p:spPr>
+        <p:txBody>
+          <a:bodyPr>
+            <a:normAutofit/>
+          </a:bodyPr>
+          <a:lstStyle/>
+          <a:p>
+            <a:pPr marL="457200" indent="-457200" algn="r" rtl="1">
+              <a:lnSpc>
+                <a:spcPct val="100000"/>
+              </a:lnSpc>
+              <a:spcAft>
+                <a:spcPts val="1200"/>
+              </a:spcAft>
+              <a:buFont typeface="+mj-lt"/>
+              <a:buAutoNum type="arabicPeriod" startAt="2"/>
+            </a:pPr>
+            <a:r>
+              <a:rPr lang="ar-SY" sz="2400" b="1" dirty="0">
+                <a:solidFill>
+                  <a:srgbClr val="FF0000"/>
+                </a:solidFill>
+                <a:latin typeface="Arial" panose="020B0604020202020204" pitchFamily="34" charset="0"/>
+              </a:rPr>
+              <a:t>دارة القيادة ذات العزل الضوئي/الراديوي المستقلة </a:t>
+            </a:r>
+            <a:r>
+              <a:rPr lang="en-US" sz="2400" b="1" dirty="0">
+                <a:solidFill>
+                  <a:srgbClr val="FF0000"/>
+                </a:solidFill>
+                <a:latin typeface="Arial" panose="020B0604020202020204" pitchFamily="34" charset="0"/>
+              </a:rPr>
+              <a:t>Opto-Isolation/RF Isolation plus independent driver</a:t>
+            </a:r>
+          </a:p>
+        </p:txBody>
+      </p:sp>
+      <p:sp>
+        <p:nvSpPr>
+          <p:cNvPr id="2" name="Title 1">
+            <a:extLst>
+              <a:ext uri="{FF2B5EF4-FFF2-40B4-BE49-F238E27FC236}">
+                <a16:creationId xmlns:a16="http://schemas.microsoft.com/office/drawing/2014/main" id="{D6F7A68E-9C7F-4E94-92BE-304A8776DF03}"/>
+              </a:ext>
+            </a:extLst>
+          </p:cNvPr>
+          <p:cNvSpPr>
+            <a:spLocks noGrp="1"/>
+          </p:cNvSpPr>
+          <p:nvPr>
+            <p:ph type="title"/>
+          </p:nvPr>
+        </p:nvSpPr>
+        <p:spPr>
+          <a:xfrm>
+            <a:off x="838200" y="1"/>
+            <a:ext cx="10515600" cy="791109"/>
+          </a:xfrm>
+        </p:spPr>
+        <p:txBody>
+          <a:bodyPr>
+            <a:normAutofit/>
+          </a:bodyPr>
+          <a:lstStyle/>
+          <a:p>
+            <a:pPr algn="ctr" rtl="1"/>
+            <a:r>
+              <a:rPr lang="ar-SY" sz="3600" b="1" dirty="0">
+                <a:solidFill>
+                  <a:srgbClr val="FF0000"/>
+                </a:solidFill>
+                <a:cs typeface="+mn-cs"/>
+              </a:rPr>
+              <a:t>تصميم دارة قيادة البوابة </a:t>
+            </a:r>
+            <a:r>
+              <a:rPr lang="en-US" sz="3600" b="1" dirty="0">
+                <a:solidFill>
+                  <a:srgbClr val="FF0000"/>
+                </a:solidFill>
+                <a:cs typeface="+mn-cs"/>
+              </a:rPr>
+              <a:t>Gate Drive Schematic</a:t>
+            </a:r>
+          </a:p>
+        </p:txBody>
+      </p:sp>
+      <p:pic>
+        <p:nvPicPr>
+          <p:cNvPr id="4" name="Picture 3">
+            <a:extLst>
+              <a:ext uri="{FF2B5EF4-FFF2-40B4-BE49-F238E27FC236}">
+                <a16:creationId xmlns:a16="http://schemas.microsoft.com/office/drawing/2014/main" id="{A61F9527-E459-4ADE-A9EF-21576DA88E91}"/>
+              </a:ext>
+            </a:extLst>
+          </p:cNvPr>
+          <p:cNvPicPr>
+            <a:picLocks noChangeAspect="1"/>
+          </p:cNvPicPr>
+          <p:nvPr/>
+        </p:nvPicPr>
+        <p:blipFill>
+          <a:blip r:embed="rId2"/>
+          <a:stretch>
+            <a:fillRect/>
+          </a:stretch>
+        </p:blipFill>
+        <p:spPr>
+          <a:xfrm>
+            <a:off x="2226870" y="1997260"/>
+            <a:ext cx="7662007" cy="4536248"/>
+          </a:xfrm>
+          <a:prstGeom prst="rect">
+            <a:avLst/>
+          </a:prstGeom>
+        </p:spPr>
+      </p:pic>
+    </p:spTree>
+    <p:extLst>
+      <p:ext uri="{BB962C8B-B14F-4D97-AF65-F5344CB8AC3E}">
+        <p14:creationId xmlns:p14="http://schemas.microsoft.com/office/powerpoint/2010/main" val="457029502"/>
+      </p:ext>
+    </p:extLst>
+  </p:cSld>
+  <p:clrMapOvr>
+    <a:masterClrMapping/>
+  </p:clrMapOvr>
+</p:sld>
+</file>
+
+<file path=ppt/slides/slide11.xml><?xml version="1.0" encoding="utf-8"?>
+<p:sld xmlns:a="http://schemas.openxmlformats.org/drawingml/2006/main" xmlns:r="http://schemas.openxmlformats.org/officeDocument/2006/relationships" xmlns:p="http://schemas.openxmlformats.org/presentationml/2006/main">
+  <p:cSld>
+    <p:spTree>
+      <p:nvGrpSpPr>
+        <p:cNvPr id="1" name=""/>
+        <p:cNvGrpSpPr/>
+        <p:nvPr/>
+      </p:nvGrpSpPr>
+      <p:grpSpPr>
+        <a:xfrm>
+          <a:off x="0" y="0"/>
+          <a:ext cx="0" cy="0"/>
+          <a:chOff x="0" y="0"/>
+          <a:chExt cx="0" cy="0"/>
+        </a:xfrm>
+      </p:grpSpPr>
+      <p:sp>
+        <p:nvSpPr>
+          <p:cNvPr id="3" name="Content Placeholder 2">
+            <a:extLst>
+              <a:ext uri="{FF2B5EF4-FFF2-40B4-BE49-F238E27FC236}">
+                <a16:creationId xmlns:a16="http://schemas.microsoft.com/office/drawing/2014/main" id="{F7D57EB4-03F4-48DA-9B5D-2683D5BA1784}"/>
+              </a:ext>
+            </a:extLst>
+          </p:cNvPr>
+          <p:cNvSpPr>
+            <a:spLocks noGrp="1"/>
+          </p:cNvSpPr>
+          <p:nvPr>
+            <p:ph idx="1"/>
+          </p:nvPr>
+        </p:nvSpPr>
+        <p:spPr>
+          <a:xfrm>
+            <a:off x="570216" y="926635"/>
+            <a:ext cx="11106363" cy="3948453"/>
+          </a:xfrm>
+        </p:spPr>
+        <p:txBody>
+          <a:bodyPr>
+            <a:normAutofit/>
+          </a:bodyPr>
+          <a:lstStyle/>
+          <a:p>
+            <a:pPr marL="457200" indent="-457200" algn="r" rtl="1">
+              <a:lnSpc>
+                <a:spcPct val="100000"/>
+              </a:lnSpc>
+              <a:spcAft>
+                <a:spcPts val="1200"/>
+              </a:spcAft>
+              <a:buFont typeface="+mj-lt"/>
+              <a:buAutoNum type="arabicPeriod" startAt="3"/>
+            </a:pPr>
+            <a:r>
+              <a:rPr lang="ar-SY" sz="2400" b="1" dirty="0">
+                <a:solidFill>
+                  <a:srgbClr val="FF0000"/>
+                </a:solidFill>
+                <a:latin typeface="Arial" panose="020B0604020202020204" pitchFamily="34" charset="0"/>
+              </a:rPr>
+              <a:t>دارة القيادة المدمجة بشكل كامل </a:t>
+            </a:r>
+            <a:r>
+              <a:rPr lang="en-US" sz="2400" b="1" dirty="0">
+                <a:solidFill>
+                  <a:srgbClr val="FF0000"/>
+                </a:solidFill>
+                <a:latin typeface="Arial" panose="020B0604020202020204" pitchFamily="34" charset="0"/>
+              </a:rPr>
+              <a:t>Fully integrated isolated gate driver</a:t>
+            </a:r>
+          </a:p>
+          <a:p>
+            <a:pPr lvl="1" algn="r" rtl="1">
+              <a:lnSpc>
+                <a:spcPct val="100000"/>
+              </a:lnSpc>
+              <a:spcAft>
+                <a:spcPts val="1200"/>
+              </a:spcAft>
+            </a:pPr>
+            <a:r>
+              <a:rPr lang="ar-SY" sz="2000" b="1" dirty="0">
+                <a:latin typeface="Arial" panose="020B0604020202020204" pitchFamily="34" charset="0"/>
+              </a:rPr>
+              <a:t>دارة متكاملة واحدة تحتوي ميزتي العزل وتحييز البوابة بنفس الوقت. تكون متوفرة لقناة واحدة (ترانزستور واحد) أو لأكثر من قناة.</a:t>
+            </a:r>
+          </a:p>
+          <a:p>
+            <a:pPr lvl="1" algn="r" rtl="1">
+              <a:lnSpc>
+                <a:spcPct val="100000"/>
+              </a:lnSpc>
+              <a:spcAft>
+                <a:spcPts val="1200"/>
+              </a:spcAft>
+            </a:pPr>
+            <a:r>
+              <a:rPr lang="ar-SY" sz="2000" b="1" dirty="0">
+                <a:latin typeface="Arial" panose="020B0604020202020204" pitchFamily="34" charset="0"/>
+              </a:rPr>
+              <a:t>مثال على شريحة تؤمن العزل والتحييز لنصف جسر (ترانزستورين): </a:t>
+            </a:r>
+            <a:r>
+              <a:rPr lang="en-US" sz="2000" b="1" dirty="0">
+                <a:latin typeface="Arial" panose="020B0604020202020204" pitchFamily="34" charset="0"/>
+              </a:rPr>
+              <a:t>UCC21225A </a:t>
+            </a:r>
+            <a:r>
+              <a:rPr lang="ar-SY" sz="2000" b="1" dirty="0">
+                <a:latin typeface="Arial" panose="020B0604020202020204" pitchFamily="34" charset="0"/>
+              </a:rPr>
+              <a:t>.</a:t>
+            </a:r>
+          </a:p>
+          <a:p>
+            <a:pPr lvl="1" algn="r" rtl="1">
+              <a:lnSpc>
+                <a:spcPct val="100000"/>
+              </a:lnSpc>
+              <a:spcAft>
+                <a:spcPts val="1200"/>
+              </a:spcAft>
+            </a:pPr>
+            <a:r>
+              <a:rPr lang="ar-SY" sz="2000" b="1" dirty="0">
+                <a:latin typeface="Arial" panose="020B0604020202020204" pitchFamily="34" charset="0"/>
+              </a:rPr>
+              <a:t>مثال على شريحة تؤمن العزل الراديوي والتحييز لترانزستور واحد: </a:t>
+            </a:r>
+            <a:r>
+              <a:rPr lang="en-US" sz="2000" b="1" dirty="0">
+                <a:latin typeface="Arial" panose="020B0604020202020204" pitchFamily="34" charset="0"/>
+              </a:rPr>
+              <a:t>1EDI60N12AFXUMA1 </a:t>
+            </a:r>
+            <a:r>
+              <a:rPr lang="ar-SY" sz="2000" b="1" dirty="0">
+                <a:latin typeface="Arial" panose="020B0604020202020204" pitchFamily="34" charset="0"/>
+              </a:rPr>
+              <a:t>.</a:t>
+            </a:r>
+          </a:p>
+          <a:p>
+            <a:pPr lvl="1" algn="r" rtl="1">
+              <a:lnSpc>
+                <a:spcPct val="100000"/>
+              </a:lnSpc>
+              <a:spcAft>
+                <a:spcPts val="1200"/>
+              </a:spcAft>
+            </a:pPr>
+            <a:r>
+              <a:rPr lang="ar-SY" sz="2000" b="1" dirty="0">
+                <a:latin typeface="Arial" panose="020B0604020202020204" pitchFamily="34" charset="0"/>
+              </a:rPr>
+              <a:t>عادة ما تكون هذه الشرائح </a:t>
+            </a:r>
+            <a:r>
+              <a:rPr lang="ar-SY" sz="2000" b="1" dirty="0">
+                <a:solidFill>
+                  <a:srgbClr val="FF0000"/>
+                </a:solidFill>
+                <a:latin typeface="Arial" panose="020B0604020202020204" pitchFamily="34" charset="0"/>
+              </a:rPr>
+              <a:t>أغلى من الحلول السابقة ولكنها توفر في مساحة الدارة المطبوعة</a:t>
+            </a:r>
+            <a:r>
+              <a:rPr lang="ar-SY" sz="2000" b="1" dirty="0">
+                <a:latin typeface="Arial" panose="020B0604020202020204" pitchFamily="34" charset="0"/>
+              </a:rPr>
+              <a:t>.</a:t>
+            </a:r>
+          </a:p>
+          <a:p>
+            <a:pPr lvl="1" algn="r" rtl="1">
+              <a:lnSpc>
+                <a:spcPct val="100000"/>
+              </a:lnSpc>
+              <a:spcAft>
+                <a:spcPts val="1200"/>
+              </a:spcAft>
+            </a:pPr>
+            <a:r>
+              <a:rPr lang="ar-SY" sz="2000" b="1" dirty="0">
+                <a:latin typeface="Arial" panose="020B0604020202020204" pitchFamily="34" charset="0"/>
+              </a:rPr>
+              <a:t>من مساوئ هذه الطريقة أن هذه الدارات المتكاملة غير شائعة وأحياناً تُفقد من الأسواق، لذلك يجب الانتباه عند استخدامها في التطبيقات المصنعة على نطاق واسع.</a:t>
+            </a:r>
+            <a:endParaRPr lang="en-US" sz="2000" b="1" dirty="0">
+              <a:latin typeface="Arial" panose="020B0604020202020204" pitchFamily="34" charset="0"/>
+            </a:endParaRPr>
+          </a:p>
+        </p:txBody>
+      </p:sp>
+      <p:sp>
+        <p:nvSpPr>
+          <p:cNvPr id="2" name="Title 1">
+            <a:extLst>
+              <a:ext uri="{FF2B5EF4-FFF2-40B4-BE49-F238E27FC236}">
+                <a16:creationId xmlns:a16="http://schemas.microsoft.com/office/drawing/2014/main" id="{D6F7A68E-9C7F-4E94-92BE-304A8776DF03}"/>
+              </a:ext>
+            </a:extLst>
+          </p:cNvPr>
+          <p:cNvSpPr>
+            <a:spLocks noGrp="1"/>
+          </p:cNvSpPr>
+          <p:nvPr>
+            <p:ph type="title"/>
+          </p:nvPr>
+        </p:nvSpPr>
+        <p:spPr>
+          <a:xfrm>
+            <a:off x="838200" y="1"/>
+            <a:ext cx="10515600" cy="791109"/>
+          </a:xfrm>
+        </p:spPr>
+        <p:txBody>
+          <a:bodyPr>
+            <a:normAutofit/>
+          </a:bodyPr>
+          <a:lstStyle/>
+          <a:p>
+            <a:pPr algn="ctr" rtl="1"/>
+            <a:r>
+              <a:rPr lang="ar-SY" sz="3600" b="1" dirty="0">
+                <a:solidFill>
+                  <a:srgbClr val="FF0000"/>
+                </a:solidFill>
+                <a:cs typeface="+mn-cs"/>
+              </a:rPr>
+              <a:t>تصميم دارة قيادة البوابة </a:t>
+            </a:r>
+            <a:r>
+              <a:rPr lang="en-US" sz="3600" b="1" dirty="0">
+                <a:solidFill>
+                  <a:srgbClr val="FF0000"/>
+                </a:solidFill>
+                <a:cs typeface="+mn-cs"/>
+              </a:rPr>
+              <a:t>Gate Drive Schematic</a:t>
+            </a:r>
+          </a:p>
+        </p:txBody>
+      </p:sp>
+    </p:spTree>
+    <p:extLst>
+      <p:ext uri="{BB962C8B-B14F-4D97-AF65-F5344CB8AC3E}">
+        <p14:creationId xmlns:p14="http://schemas.microsoft.com/office/powerpoint/2010/main" val="2790621314"/>
+      </p:ext>
+    </p:extLst>
+  </p:cSld>
+  <p:clrMapOvr>
+    <a:masterClrMapping/>
+  </p:clrMapOvr>
+</p:sld>
+</file>
+
+<file path=ppt/slides/slide12.xml><?xml version="1.0" encoding="utf-8"?>
+<p:sld xmlns:a="http://schemas.openxmlformats.org/drawingml/2006/main" xmlns:r="http://schemas.openxmlformats.org/officeDocument/2006/relationships" xmlns:p="http://schemas.openxmlformats.org/presentationml/2006/main">
+  <p:cSld>
+    <p:spTree>
+      <p:nvGrpSpPr>
+        <p:cNvPr id="1" name=""/>
+        <p:cNvGrpSpPr/>
+        <p:nvPr/>
+      </p:nvGrpSpPr>
+      <p:grpSpPr>
+        <a:xfrm>
+          <a:off x="0" y="0"/>
+          <a:ext cx="0" cy="0"/>
+          <a:chOff x="0" y="0"/>
+          <a:chExt cx="0" cy="0"/>
+        </a:xfrm>
+      </p:grpSpPr>
+      <p:sp>
+        <p:nvSpPr>
+          <p:cNvPr id="3" name="Content Placeholder 2">
+            <a:extLst>
+              <a:ext uri="{FF2B5EF4-FFF2-40B4-BE49-F238E27FC236}">
+                <a16:creationId xmlns:a16="http://schemas.microsoft.com/office/drawing/2014/main" id="{F7D57EB4-03F4-48DA-9B5D-2683D5BA1784}"/>
+              </a:ext>
+            </a:extLst>
+          </p:cNvPr>
+          <p:cNvSpPr>
+            <a:spLocks noGrp="1"/>
+          </p:cNvSpPr>
+          <p:nvPr>
+            <p:ph idx="1"/>
+          </p:nvPr>
+        </p:nvSpPr>
+        <p:spPr>
+          <a:xfrm>
+            <a:off x="570216" y="926635"/>
+            <a:ext cx="11106363" cy="3948453"/>
+          </a:xfrm>
+        </p:spPr>
+        <p:txBody>
+          <a:bodyPr>
+            <a:normAutofit/>
+          </a:bodyPr>
+          <a:lstStyle/>
+          <a:p>
+            <a:pPr marL="457200" indent="-457200" algn="r" rtl="1">
+              <a:lnSpc>
+                <a:spcPct val="100000"/>
+              </a:lnSpc>
+              <a:spcAft>
+                <a:spcPts val="1200"/>
+              </a:spcAft>
+              <a:buFont typeface="+mj-lt"/>
+              <a:buAutoNum type="arabicPeriod" startAt="3"/>
+            </a:pPr>
+            <a:r>
+              <a:rPr lang="ar-SY" sz="2400" b="1" dirty="0">
+                <a:solidFill>
+                  <a:srgbClr val="FF0000"/>
+                </a:solidFill>
+                <a:latin typeface="Arial" panose="020B0604020202020204" pitchFamily="34" charset="0"/>
+              </a:rPr>
+              <a:t>دارة القيادة المدمجة بشكل كامل </a:t>
+            </a:r>
+            <a:r>
+              <a:rPr lang="en-US" sz="2400" b="1" dirty="0">
+                <a:solidFill>
+                  <a:srgbClr val="FF0000"/>
+                </a:solidFill>
+                <a:latin typeface="Arial" panose="020B0604020202020204" pitchFamily="34" charset="0"/>
+              </a:rPr>
+              <a:t>Fully integrated isolated gate driver</a:t>
+            </a:r>
+          </a:p>
+        </p:txBody>
+      </p:sp>
+      <p:sp>
+        <p:nvSpPr>
+          <p:cNvPr id="2" name="Title 1">
+            <a:extLst>
+              <a:ext uri="{FF2B5EF4-FFF2-40B4-BE49-F238E27FC236}">
+                <a16:creationId xmlns:a16="http://schemas.microsoft.com/office/drawing/2014/main" id="{D6F7A68E-9C7F-4E94-92BE-304A8776DF03}"/>
+              </a:ext>
+            </a:extLst>
+          </p:cNvPr>
+          <p:cNvSpPr>
+            <a:spLocks noGrp="1"/>
+          </p:cNvSpPr>
+          <p:nvPr>
+            <p:ph type="title"/>
+          </p:nvPr>
+        </p:nvSpPr>
+        <p:spPr>
+          <a:xfrm>
+            <a:off x="838200" y="1"/>
+            <a:ext cx="10515600" cy="791109"/>
+          </a:xfrm>
+        </p:spPr>
+        <p:txBody>
+          <a:bodyPr>
+            <a:normAutofit/>
+          </a:bodyPr>
+          <a:lstStyle/>
+          <a:p>
+            <a:pPr algn="ctr" rtl="1"/>
+            <a:r>
+              <a:rPr lang="ar-SY" sz="3600" b="1" dirty="0">
+                <a:solidFill>
+                  <a:srgbClr val="FF0000"/>
+                </a:solidFill>
+                <a:cs typeface="+mn-cs"/>
+              </a:rPr>
+              <a:t>تصميم دارة قيادة البوابة </a:t>
+            </a:r>
+            <a:r>
+              <a:rPr lang="en-US" sz="3600" b="1" dirty="0">
+                <a:solidFill>
+                  <a:srgbClr val="FF0000"/>
+                </a:solidFill>
+                <a:cs typeface="+mn-cs"/>
+              </a:rPr>
+              <a:t>Gate Drive Schematic</a:t>
+            </a:r>
+          </a:p>
+        </p:txBody>
+      </p:sp>
+      <p:pic>
+        <p:nvPicPr>
+          <p:cNvPr id="4" name="Picture 3">
+            <a:extLst>
+              <a:ext uri="{FF2B5EF4-FFF2-40B4-BE49-F238E27FC236}">
+                <a16:creationId xmlns:a16="http://schemas.microsoft.com/office/drawing/2014/main" id="{40C39831-5768-4057-9CE2-2B27D9CF8BC8}"/>
+              </a:ext>
+            </a:extLst>
+          </p:cNvPr>
+          <p:cNvPicPr>
+            <a:picLocks noChangeAspect="1"/>
+          </p:cNvPicPr>
+          <p:nvPr/>
+        </p:nvPicPr>
+        <p:blipFill>
+          <a:blip r:embed="rId2"/>
+          <a:stretch>
+            <a:fillRect/>
+          </a:stretch>
+        </p:blipFill>
+        <p:spPr>
+          <a:xfrm>
+            <a:off x="2983044" y="1594334"/>
+            <a:ext cx="6225911" cy="5089006"/>
+          </a:xfrm>
+          <a:prstGeom prst="rect">
+            <a:avLst/>
+          </a:prstGeom>
+        </p:spPr>
+      </p:pic>
+    </p:spTree>
+    <p:extLst>
+      <p:ext uri="{BB962C8B-B14F-4D97-AF65-F5344CB8AC3E}">
+        <p14:creationId xmlns:p14="http://schemas.microsoft.com/office/powerpoint/2010/main" val="60929243"/>
+      </p:ext>
+    </p:extLst>
+  </p:cSld>
+  <p:clrMapOvr>
+    <a:masterClrMapping/>
+  </p:clrMapOvr>
+</p:sld>
+</file>
+
+<file path=ppt/slides/slide13.xml><?xml version="1.0" encoding="utf-8"?>
+<p:sld xmlns:a="http://schemas.openxmlformats.org/drawingml/2006/main" xmlns:r="http://schemas.openxmlformats.org/officeDocument/2006/relationships" xmlns:p="http://schemas.openxmlformats.org/presentationml/2006/main">
+  <p:cSld>
+    <p:spTree>
+      <p:nvGrpSpPr>
+        <p:cNvPr id="1" name=""/>
+        <p:cNvGrpSpPr/>
+        <p:nvPr/>
+      </p:nvGrpSpPr>
+      <p:grpSpPr>
+        <a:xfrm>
+          <a:off x="0" y="0"/>
+          <a:ext cx="0" cy="0"/>
+          <a:chOff x="0" y="0"/>
+          <a:chExt cx="0" cy="0"/>
+        </a:xfrm>
+      </p:grpSpPr>
+      <p:sp>
+        <p:nvSpPr>
+          <p:cNvPr id="3" name="Content Placeholder 2">
+            <a:extLst>
+              <a:ext uri="{FF2B5EF4-FFF2-40B4-BE49-F238E27FC236}">
+                <a16:creationId xmlns:a16="http://schemas.microsoft.com/office/drawing/2014/main" id="{F7D57EB4-03F4-48DA-9B5D-2683D5BA1784}"/>
+              </a:ext>
+            </a:extLst>
+          </p:cNvPr>
+          <p:cNvSpPr>
+            <a:spLocks noGrp="1"/>
+          </p:cNvSpPr>
+          <p:nvPr>
+            <p:ph idx="1"/>
+          </p:nvPr>
+        </p:nvSpPr>
+        <p:spPr>
+          <a:xfrm>
+            <a:off x="570216" y="926635"/>
+            <a:ext cx="11106363" cy="3948453"/>
+          </a:xfrm>
+        </p:spPr>
+        <p:txBody>
+          <a:bodyPr>
+            <a:normAutofit/>
+          </a:bodyPr>
+          <a:lstStyle/>
+          <a:p>
+            <a:pPr marL="457200" indent="-457200" algn="r" rtl="1">
+              <a:lnSpc>
+                <a:spcPct val="100000"/>
+              </a:lnSpc>
+              <a:spcAft>
+                <a:spcPts val="1200"/>
+              </a:spcAft>
+              <a:buFont typeface="+mj-lt"/>
+              <a:buAutoNum type="arabicPeriod" startAt="3"/>
+            </a:pPr>
+            <a:r>
+              <a:rPr lang="ar-SY" sz="2400" b="1" dirty="0">
+                <a:solidFill>
+                  <a:srgbClr val="FF0000"/>
+                </a:solidFill>
+                <a:latin typeface="Arial" panose="020B0604020202020204" pitchFamily="34" charset="0"/>
+              </a:rPr>
+              <a:t>دارة القيادة المدمجة بشكل كامل </a:t>
+            </a:r>
+            <a:r>
+              <a:rPr lang="en-US" sz="2400" b="1" dirty="0">
+                <a:solidFill>
+                  <a:srgbClr val="FF0000"/>
+                </a:solidFill>
+                <a:latin typeface="Arial" panose="020B0604020202020204" pitchFamily="34" charset="0"/>
+              </a:rPr>
+              <a:t>Fully integrated isolated gate driver</a:t>
+            </a:r>
+          </a:p>
+        </p:txBody>
+      </p:sp>
+      <p:sp>
+        <p:nvSpPr>
+          <p:cNvPr id="2" name="Title 1">
+            <a:extLst>
+              <a:ext uri="{FF2B5EF4-FFF2-40B4-BE49-F238E27FC236}">
+                <a16:creationId xmlns:a16="http://schemas.microsoft.com/office/drawing/2014/main" id="{D6F7A68E-9C7F-4E94-92BE-304A8776DF03}"/>
+              </a:ext>
+            </a:extLst>
+          </p:cNvPr>
+          <p:cNvSpPr>
+            <a:spLocks noGrp="1"/>
+          </p:cNvSpPr>
+          <p:nvPr>
+            <p:ph type="title"/>
+          </p:nvPr>
+        </p:nvSpPr>
+        <p:spPr>
+          <a:xfrm>
+            <a:off x="838200" y="1"/>
+            <a:ext cx="10515600" cy="791109"/>
+          </a:xfrm>
+        </p:spPr>
+        <p:txBody>
+          <a:bodyPr>
+            <a:normAutofit/>
+          </a:bodyPr>
+          <a:lstStyle/>
+          <a:p>
+            <a:pPr algn="ctr" rtl="1"/>
+            <a:r>
+              <a:rPr lang="ar-SY" sz="3600" b="1" dirty="0">
+                <a:solidFill>
+                  <a:srgbClr val="FF0000"/>
+                </a:solidFill>
+                <a:cs typeface="+mn-cs"/>
+              </a:rPr>
+              <a:t>تصميم دارة قيادة البوابة </a:t>
+            </a:r>
+            <a:r>
+              <a:rPr lang="en-US" sz="3600" b="1" dirty="0">
+                <a:solidFill>
+                  <a:srgbClr val="FF0000"/>
+                </a:solidFill>
+                <a:cs typeface="+mn-cs"/>
+              </a:rPr>
+              <a:t>Gate Drive Schematic</a:t>
+            </a:r>
+          </a:p>
+        </p:txBody>
+      </p:sp>
+      <p:pic>
+        <p:nvPicPr>
+          <p:cNvPr id="5" name="Picture 4">
+            <a:extLst>
+              <a:ext uri="{FF2B5EF4-FFF2-40B4-BE49-F238E27FC236}">
+                <a16:creationId xmlns:a16="http://schemas.microsoft.com/office/drawing/2014/main" id="{B9E0A291-5693-4E08-A3EA-D50484D2BD5B}"/>
+              </a:ext>
+            </a:extLst>
+          </p:cNvPr>
+          <p:cNvPicPr>
+            <a:picLocks noChangeAspect="1"/>
+          </p:cNvPicPr>
+          <p:nvPr/>
+        </p:nvPicPr>
+        <p:blipFill>
+          <a:blip r:embed="rId2"/>
+          <a:stretch>
+            <a:fillRect/>
+          </a:stretch>
+        </p:blipFill>
+        <p:spPr>
+          <a:xfrm>
+            <a:off x="3607242" y="1532812"/>
+            <a:ext cx="4977515" cy="5210888"/>
+          </a:xfrm>
+          <a:prstGeom prst="rect">
+            <a:avLst/>
+          </a:prstGeom>
+        </p:spPr>
+      </p:pic>
+    </p:spTree>
+    <p:extLst>
+      <p:ext uri="{BB962C8B-B14F-4D97-AF65-F5344CB8AC3E}">
+        <p14:creationId xmlns:p14="http://schemas.microsoft.com/office/powerpoint/2010/main" val="2812234166"/>
+      </p:ext>
+    </p:extLst>
+  </p:cSld>
+  <p:clrMapOvr>
+    <a:masterClrMapping/>
+  </p:clrMapOvr>
+</p:sld>
+</file>
+
+<file path=ppt/slides/slide14.xml><?xml version="1.0" encoding="utf-8"?>
+<p:sld xmlns:a="http://schemas.openxmlformats.org/drawingml/2006/main" xmlns:r="http://schemas.openxmlformats.org/officeDocument/2006/relationships" xmlns:p="http://schemas.openxmlformats.org/presentationml/2006/main">
+  <p:cSld>
+    <p:spTree>
+      <p:nvGrpSpPr>
+        <p:cNvPr id="1" name=""/>
+        <p:cNvGrpSpPr/>
+        <p:nvPr/>
+      </p:nvGrpSpPr>
+      <p:grpSpPr>
+        <a:xfrm>
+          <a:off x="0" y="0"/>
+          <a:ext cx="0" cy="0"/>
+          <a:chOff x="0" y="0"/>
+          <a:chExt cx="0" cy="0"/>
+        </a:xfrm>
+      </p:grpSpPr>
+      <p:sp>
+        <p:nvSpPr>
+          <p:cNvPr id="2" name="Title 1">
+            <a:extLst>
+              <a:ext uri="{FF2B5EF4-FFF2-40B4-BE49-F238E27FC236}">
+                <a16:creationId xmlns:a16="http://schemas.microsoft.com/office/drawing/2014/main" id="{D6F7A68E-9C7F-4E94-92BE-304A8776DF03}"/>
+              </a:ext>
+            </a:extLst>
+          </p:cNvPr>
+          <p:cNvSpPr>
+            <a:spLocks noGrp="1"/>
+          </p:cNvSpPr>
+          <p:nvPr>
+            <p:ph type="title"/>
+          </p:nvPr>
+        </p:nvSpPr>
+        <p:spPr>
+          <a:xfrm>
+            <a:off x="838200" y="1"/>
+            <a:ext cx="10515600" cy="791109"/>
+          </a:xfrm>
+        </p:spPr>
+        <p:txBody>
+          <a:bodyPr>
+            <a:normAutofit fontScale="90000"/>
+          </a:bodyPr>
+          <a:lstStyle/>
+          <a:p>
+            <a:pPr algn="ctr" rtl="1"/>
+            <a:r>
+              <a:rPr lang="ar-SY" sz="3600" b="1" dirty="0">
+                <a:solidFill>
+                  <a:srgbClr val="FF0000"/>
+                </a:solidFill>
+                <a:cs typeface="+mn-cs"/>
+              </a:rPr>
+              <a:t>تأمين التغذية للترانزستور العلوي </a:t>
+            </a:r>
+            <a:r>
+              <a:rPr lang="en-US" sz="3600" b="1" dirty="0">
+                <a:solidFill>
+                  <a:srgbClr val="FF0000"/>
+                </a:solidFill>
+                <a:cs typeface="+mn-cs"/>
+              </a:rPr>
+              <a:t>High Side Gate Drive Supply Rail</a:t>
+            </a:r>
+          </a:p>
+        </p:txBody>
+      </p:sp>
+    </p:spTree>
+    <p:extLst>
+      <p:ext uri="{BB962C8B-B14F-4D97-AF65-F5344CB8AC3E}">
+        <p14:creationId xmlns:p14="http://schemas.microsoft.com/office/powerpoint/2010/main" val="2604518221"/>
+      </p:ext>
+    </p:extLst>
+  </p:cSld>
+  <p:clrMapOvr>
+    <a:masterClrMapping/>
+  </p:clrMapOvr>
+</p:sld>
+</file>
+
+<file path=ppt/slides/slide15.xml><?xml version="1.0" encoding="utf-8"?>
+<p:sld xmlns:a="http://schemas.openxmlformats.org/drawingml/2006/main" xmlns:r="http://schemas.openxmlformats.org/officeDocument/2006/relationships" xmlns:p="http://schemas.openxmlformats.org/presentationml/2006/main">
+  <p:cSld>
+    <p:spTree>
+      <p:nvGrpSpPr>
+        <p:cNvPr id="1" name=""/>
+        <p:cNvGrpSpPr/>
+        <p:nvPr/>
+      </p:nvGrpSpPr>
+      <p:grpSpPr>
+        <a:xfrm>
+          <a:off x="0" y="0"/>
+          <a:ext cx="0" cy="0"/>
+          <a:chOff x="0" y="0"/>
+          <a:chExt cx="0" cy="0"/>
+        </a:xfrm>
+      </p:grpSpPr>
+      <p:sp>
+        <p:nvSpPr>
+          <p:cNvPr id="2" name="Title 1">
+            <a:extLst>
+              <a:ext uri="{FF2B5EF4-FFF2-40B4-BE49-F238E27FC236}">
+                <a16:creationId xmlns:a16="http://schemas.microsoft.com/office/drawing/2014/main" id="{D6F7A68E-9C7F-4E94-92BE-304A8776DF03}"/>
+              </a:ext>
+            </a:extLst>
+          </p:cNvPr>
+          <p:cNvSpPr>
+            <a:spLocks noGrp="1"/>
+          </p:cNvSpPr>
+          <p:nvPr>
+            <p:ph type="title"/>
+          </p:nvPr>
+        </p:nvSpPr>
+        <p:spPr>
+          <a:xfrm>
+            <a:off x="838200" y="1"/>
+            <a:ext cx="10515600" cy="791109"/>
+          </a:xfrm>
+        </p:spPr>
+        <p:txBody>
+          <a:bodyPr>
+            <a:normAutofit/>
+          </a:bodyPr>
+          <a:lstStyle/>
+          <a:p>
+            <a:pPr algn="ctr" rtl="1"/>
+            <a:r>
+              <a:rPr lang="ar-SY" sz="3600" b="1" dirty="0">
+                <a:solidFill>
+                  <a:srgbClr val="FF0000"/>
+                </a:solidFill>
+                <a:cs typeface="+mn-cs"/>
+              </a:rPr>
+              <a:t>الدارات المطبوعة لدارات قيادة البوابة </a:t>
+            </a:r>
+            <a:r>
+              <a:rPr lang="en-US" sz="3600" b="1" dirty="0">
+                <a:solidFill>
+                  <a:srgbClr val="FF0000"/>
+                </a:solidFill>
+                <a:cs typeface="+mn-cs"/>
+              </a:rPr>
+              <a:t>Gate Drive Layout</a:t>
+            </a:r>
+          </a:p>
+        </p:txBody>
+      </p:sp>
+    </p:spTree>
+    <p:extLst>
+      <p:ext uri="{BB962C8B-B14F-4D97-AF65-F5344CB8AC3E}">
+        <p14:creationId xmlns:p14="http://schemas.microsoft.com/office/powerpoint/2010/main" val="955897715"/>
+      </p:ext>
+    </p:extLst>
+  </p:cSld>
+  <p:clrMapOvr>
+    <a:masterClrMapping/>
+  </p:clrMapOvr>
+</p:sld>
+</file>
+
 <file path=ppt/slides/slide2.xml><?xml version="1.0" encoding="utf-8"?>
 <p:sld xmlns:a="http://schemas.openxmlformats.org/drawingml/2006/main" xmlns:r="http://schemas.openxmlformats.org/officeDocument/2006/relationships" xmlns:p="http://schemas.openxmlformats.org/presentationml/2006/main">
   <p:cSld>
@@ -5136,6 +6078,815 @@
     <p:extLst>
       <p:ext uri="{BB962C8B-B14F-4D97-AF65-F5344CB8AC3E}">
         <p14:creationId xmlns:p14="http://schemas.microsoft.com/office/powerpoint/2010/main" val="1850273133"/>
+      </p:ext>
+    </p:extLst>
+  </p:cSld>
+  <p:clrMapOvr>
+    <a:masterClrMapping/>
+  </p:clrMapOvr>
+</p:sld>
+</file>
+
+<file path=ppt/slides/slide7.xml><?xml version="1.0" encoding="utf-8"?>
+<p:sld xmlns:a="http://schemas.openxmlformats.org/drawingml/2006/main" xmlns:r="http://schemas.openxmlformats.org/officeDocument/2006/relationships" xmlns:p="http://schemas.openxmlformats.org/presentationml/2006/main">
+  <p:cSld>
+    <p:spTree>
+      <p:nvGrpSpPr>
+        <p:cNvPr id="1" name=""/>
+        <p:cNvGrpSpPr/>
+        <p:nvPr/>
+      </p:nvGrpSpPr>
+      <p:grpSpPr>
+        <a:xfrm>
+          <a:off x="0" y="0"/>
+          <a:ext cx="0" cy="0"/>
+          <a:chOff x="0" y="0"/>
+          <a:chExt cx="0" cy="0"/>
+        </a:xfrm>
+      </p:grpSpPr>
+      <p:sp>
+        <p:nvSpPr>
+          <p:cNvPr id="3" name="Content Placeholder 2">
+            <a:extLst>
+              <a:ext uri="{FF2B5EF4-FFF2-40B4-BE49-F238E27FC236}">
+                <a16:creationId xmlns:a16="http://schemas.microsoft.com/office/drawing/2014/main" id="{F7D57EB4-03F4-48DA-9B5D-2683D5BA1784}"/>
+              </a:ext>
+            </a:extLst>
+          </p:cNvPr>
+          <p:cNvSpPr>
+            <a:spLocks noGrp="1"/>
+          </p:cNvSpPr>
+          <p:nvPr>
+            <p:ph idx="1"/>
+          </p:nvPr>
+        </p:nvSpPr>
+        <p:spPr>
+          <a:xfrm>
+            <a:off x="570216" y="926635"/>
+            <a:ext cx="11106363" cy="5515261"/>
+          </a:xfrm>
+        </p:spPr>
+        <p:txBody>
+          <a:bodyPr>
+            <a:normAutofit/>
+          </a:bodyPr>
+          <a:lstStyle/>
+          <a:p>
+            <a:pPr marL="457200" indent="-457200" algn="r" rtl="1">
+              <a:lnSpc>
+                <a:spcPct val="100000"/>
+              </a:lnSpc>
+              <a:spcAft>
+                <a:spcPts val="1200"/>
+              </a:spcAft>
+              <a:buFont typeface="+mj-lt"/>
+              <a:buAutoNum type="arabicPeriod" startAt="2"/>
+            </a:pPr>
+            <a:r>
+              <a:rPr lang="ar-SY" sz="2400" b="1" dirty="0">
+                <a:solidFill>
+                  <a:srgbClr val="FF0000"/>
+                </a:solidFill>
+                <a:latin typeface="Arial" panose="020B0604020202020204" pitchFamily="34" charset="0"/>
+              </a:rPr>
+              <a:t>دارة القيادة ذات العزل الضوئي/الراديوي المستقلة </a:t>
+            </a:r>
+            <a:r>
+              <a:rPr lang="en-US" sz="2400" b="1" dirty="0">
+                <a:solidFill>
+                  <a:srgbClr val="FF0000"/>
+                </a:solidFill>
+                <a:latin typeface="Arial" panose="020B0604020202020204" pitchFamily="34" charset="0"/>
+              </a:rPr>
+              <a:t>Opto-Isolation/RF Isolation plus independent driver</a:t>
+            </a:r>
+          </a:p>
+          <a:p>
+            <a:pPr lvl="1" algn="r" rtl="1">
+              <a:lnSpc>
+                <a:spcPct val="100000"/>
+              </a:lnSpc>
+              <a:spcAft>
+                <a:spcPts val="1200"/>
+              </a:spcAft>
+            </a:pPr>
+            <a:r>
+              <a:rPr lang="ar-SY" sz="2000" b="1" dirty="0">
+                <a:latin typeface="Arial" panose="020B0604020202020204" pitchFamily="34" charset="0"/>
+              </a:rPr>
+              <a:t>من أفضل الحلول للحصول على دارة قيادة عالية </a:t>
+            </a:r>
+            <a:r>
+              <a:rPr lang="ar-SY" sz="2000" b="1" dirty="0" err="1">
+                <a:latin typeface="Arial" panose="020B0604020202020204" pitchFamily="34" charset="0"/>
+              </a:rPr>
+              <a:t>الوثوقية</a:t>
+            </a:r>
+            <a:r>
+              <a:rPr lang="ar-SY" sz="2000" b="1" dirty="0">
+                <a:latin typeface="Arial" panose="020B0604020202020204" pitchFamily="34" charset="0"/>
+              </a:rPr>
+              <a:t> والأداء!</a:t>
+            </a:r>
+          </a:p>
+          <a:p>
+            <a:pPr lvl="1" algn="r" rtl="1">
+              <a:lnSpc>
+                <a:spcPct val="100000"/>
+              </a:lnSpc>
+              <a:spcAft>
+                <a:spcPts val="1200"/>
+              </a:spcAft>
+            </a:pPr>
+            <a:r>
+              <a:rPr lang="ar-SY" sz="2000" b="1" dirty="0">
+                <a:latin typeface="Arial" panose="020B0604020202020204" pitchFamily="34" charset="0"/>
+              </a:rPr>
+              <a:t>يمكنك اختيار العازل الضوئي المفضل لديك (مثلاً العوازل منخفضة التيار، أو العوازل التي تستخدم ترانزستور خرج بتوصيلة </a:t>
+            </a:r>
+            <a:r>
+              <a:rPr lang="en-US" sz="2000" b="1" dirty="0">
+                <a:latin typeface="Arial" panose="020B0604020202020204" pitchFamily="34" charset="0"/>
+              </a:rPr>
+              <a:t>push-pull</a:t>
+            </a:r>
+            <a:r>
+              <a:rPr lang="ar-SY" sz="2000" b="1" dirty="0">
+                <a:latin typeface="Arial" panose="020B0604020202020204" pitchFamily="34" charset="0"/>
+              </a:rPr>
+              <a:t> لتيارات أعلى، الخ) ومن ثم إضافة دارة متكاملة لقيادة بوابة كل ترانزستور سفلي بعد العازل الضوئي. أما الترانزستور العلوي فيمكن استخدام عناصر الكترونية منفصلة لتأمين الجهد المرتفع هناك وهو ما يعرف ب </a:t>
+            </a:r>
+            <a:r>
+              <a:rPr lang="en-US" sz="2000" b="1" dirty="0">
+                <a:latin typeface="Arial" panose="020B0604020202020204" pitchFamily="34" charset="0"/>
+              </a:rPr>
+              <a:t>bootstrap</a:t>
+            </a:r>
+            <a:r>
+              <a:rPr lang="ar-SY" sz="2000" b="1" dirty="0">
+                <a:latin typeface="Arial" panose="020B0604020202020204" pitchFamily="34" charset="0"/>
+              </a:rPr>
+              <a:t>. </a:t>
+            </a:r>
+          </a:p>
+          <a:p>
+            <a:pPr lvl="1" algn="r" rtl="1">
+              <a:lnSpc>
+                <a:spcPct val="100000"/>
+              </a:lnSpc>
+              <a:spcAft>
+                <a:spcPts val="1200"/>
+              </a:spcAft>
+            </a:pPr>
+            <a:r>
+              <a:rPr lang="ar-SY" sz="2000" b="1" dirty="0">
+                <a:latin typeface="Arial" panose="020B0604020202020204" pitchFamily="34" charset="0"/>
+              </a:rPr>
+              <a:t>كمثال عملي لهذه الطريقة يمكن أن تكون شريحة القيادة </a:t>
+            </a:r>
+            <a:r>
+              <a:rPr lang="en-US" sz="2000" b="1" dirty="0">
+                <a:latin typeface="Arial" panose="020B0604020202020204" pitchFamily="34" charset="0"/>
+              </a:rPr>
+              <a:t>FAN3122</a:t>
+            </a:r>
+            <a:r>
+              <a:rPr lang="ar-SY" sz="2000" b="1" dirty="0">
+                <a:latin typeface="Arial" panose="020B0604020202020204" pitchFamily="34" charset="0"/>
+              </a:rPr>
+              <a:t> يسبقها عازل ضوئي </a:t>
+            </a:r>
+            <a:r>
+              <a:rPr lang="en-US" sz="2000" b="1" dirty="0">
+                <a:latin typeface="Arial" panose="020B0604020202020204" pitchFamily="34" charset="0"/>
+              </a:rPr>
+              <a:t>TLP155</a:t>
+            </a:r>
+            <a:r>
+              <a:rPr lang="ar-SY" sz="2000" b="1" dirty="0">
+                <a:latin typeface="Arial" panose="020B0604020202020204" pitchFamily="34" charset="0"/>
+              </a:rPr>
+              <a:t> أو عازل راديوي </a:t>
+            </a:r>
+            <a:r>
+              <a:rPr lang="en-US" sz="2000" b="1" dirty="0">
+                <a:latin typeface="Arial" panose="020B0604020202020204" pitchFamily="34" charset="0"/>
+              </a:rPr>
+              <a:t>Si8620</a:t>
+            </a:r>
+            <a:r>
+              <a:rPr lang="ar-SY" sz="2000" b="1" dirty="0">
+                <a:latin typeface="Arial" panose="020B0604020202020204" pitchFamily="34" charset="0"/>
+              </a:rPr>
+              <a:t>.</a:t>
+            </a:r>
+          </a:p>
+          <a:p>
+            <a:pPr lvl="1" algn="r" rtl="1">
+              <a:lnSpc>
+                <a:spcPct val="100000"/>
+              </a:lnSpc>
+              <a:spcAft>
+                <a:spcPts val="1200"/>
+              </a:spcAft>
+            </a:pPr>
+            <a:r>
+              <a:rPr lang="ar-SY" sz="2000" b="1" dirty="0">
+                <a:latin typeface="Arial" panose="020B0604020202020204" pitchFamily="34" charset="0"/>
+              </a:rPr>
+              <a:t>تكون العوازل الراديوية عادة أغلى ثمناً بقليل من الضوئية ولكنها أسرع بكثير حيث يكون زمن الانتشار </a:t>
+            </a:r>
+            <a:r>
+              <a:rPr lang="en-US" sz="2000" b="1" dirty="0">
+                <a:latin typeface="Arial" panose="020B0604020202020204" pitchFamily="34" charset="0"/>
+              </a:rPr>
+              <a:t>propagation delay</a:t>
+            </a:r>
+            <a:r>
+              <a:rPr lang="ar-SY" sz="2000" b="1" dirty="0">
+                <a:latin typeface="Arial" panose="020B0604020202020204" pitchFamily="34" charset="0"/>
+              </a:rPr>
+              <a:t> قيها أقل بكثير.</a:t>
+            </a:r>
+          </a:p>
+          <a:p>
+            <a:pPr lvl="1" algn="r" rtl="1">
+              <a:lnSpc>
+                <a:spcPct val="100000"/>
+              </a:lnSpc>
+              <a:spcAft>
+                <a:spcPts val="1200"/>
+              </a:spcAft>
+            </a:pPr>
+            <a:r>
+              <a:rPr lang="ar-SY" sz="2000" b="1" dirty="0">
+                <a:latin typeface="Arial" panose="020B0604020202020204" pitchFamily="34" charset="0"/>
+              </a:rPr>
+              <a:t>أهم مزايا هذه الطريقة </a:t>
+            </a:r>
+            <a:r>
+              <a:rPr lang="ar-SY" sz="2000" b="1" dirty="0">
+                <a:solidFill>
+                  <a:srgbClr val="FF0000"/>
+                </a:solidFill>
+                <a:latin typeface="Arial" panose="020B0604020202020204" pitchFamily="34" charset="0"/>
+              </a:rPr>
+              <a:t>الموثوقية العالية </a:t>
+            </a:r>
+            <a:r>
+              <a:rPr lang="ar-SY" sz="2000" b="1" dirty="0">
+                <a:latin typeface="Arial" panose="020B0604020202020204" pitchFamily="34" charset="0"/>
+              </a:rPr>
+              <a:t>ضد مشاكل الأرضي أو الحالات العابرة الأخرى.</a:t>
+            </a:r>
+          </a:p>
+          <a:p>
+            <a:pPr lvl="1" algn="r" rtl="1">
+              <a:lnSpc>
+                <a:spcPct val="100000"/>
+              </a:lnSpc>
+              <a:spcAft>
+                <a:spcPts val="1200"/>
+              </a:spcAft>
+            </a:pPr>
+            <a:r>
+              <a:rPr lang="ar-SY" sz="2000" b="1" dirty="0">
+                <a:latin typeface="Arial" panose="020B0604020202020204" pitchFamily="34" charset="0"/>
+              </a:rPr>
+              <a:t>مساوئ هذه الطريقة ارتفاع كلفة العوازل بالإضافة إلى استهلاكها مساحة إضافية من الدارة المطبوعة.</a:t>
+            </a:r>
+            <a:endParaRPr lang="en-US" sz="2000" b="1" dirty="0">
+              <a:latin typeface="Arial" panose="020B0604020202020204" pitchFamily="34" charset="0"/>
+            </a:endParaRPr>
+          </a:p>
+        </p:txBody>
+      </p:sp>
+      <p:sp>
+        <p:nvSpPr>
+          <p:cNvPr id="2" name="Title 1">
+            <a:extLst>
+              <a:ext uri="{FF2B5EF4-FFF2-40B4-BE49-F238E27FC236}">
+                <a16:creationId xmlns:a16="http://schemas.microsoft.com/office/drawing/2014/main" id="{D6F7A68E-9C7F-4E94-92BE-304A8776DF03}"/>
+              </a:ext>
+            </a:extLst>
+          </p:cNvPr>
+          <p:cNvSpPr>
+            <a:spLocks noGrp="1"/>
+          </p:cNvSpPr>
+          <p:nvPr>
+            <p:ph type="title"/>
+          </p:nvPr>
+        </p:nvSpPr>
+        <p:spPr>
+          <a:xfrm>
+            <a:off x="838200" y="1"/>
+            <a:ext cx="10515600" cy="791109"/>
+          </a:xfrm>
+        </p:spPr>
+        <p:txBody>
+          <a:bodyPr>
+            <a:normAutofit/>
+          </a:bodyPr>
+          <a:lstStyle/>
+          <a:p>
+            <a:pPr algn="ctr" rtl="1"/>
+            <a:r>
+              <a:rPr lang="ar-SY" sz="3600" b="1" dirty="0">
+                <a:solidFill>
+                  <a:srgbClr val="FF0000"/>
+                </a:solidFill>
+                <a:cs typeface="+mn-cs"/>
+              </a:rPr>
+              <a:t>تصميم دارة قيادة البوابة </a:t>
+            </a:r>
+            <a:r>
+              <a:rPr lang="en-US" sz="3600" b="1" dirty="0">
+                <a:solidFill>
+                  <a:srgbClr val="FF0000"/>
+                </a:solidFill>
+                <a:cs typeface="+mn-cs"/>
+              </a:rPr>
+              <a:t>Gate Drive Schematic</a:t>
+            </a:r>
+          </a:p>
+        </p:txBody>
+      </p:sp>
+    </p:spTree>
+    <p:extLst>
+      <p:ext uri="{BB962C8B-B14F-4D97-AF65-F5344CB8AC3E}">
+        <p14:creationId xmlns:p14="http://schemas.microsoft.com/office/powerpoint/2010/main" val="3537409778"/>
+      </p:ext>
+    </p:extLst>
+  </p:cSld>
+  <p:clrMapOvr>
+    <a:masterClrMapping/>
+  </p:clrMapOvr>
+</p:sld>
+</file>
+
+<file path=ppt/slides/slide8.xml><?xml version="1.0" encoding="utf-8"?>
+<p:sld xmlns:a="http://schemas.openxmlformats.org/drawingml/2006/main" xmlns:r="http://schemas.openxmlformats.org/officeDocument/2006/relationships" xmlns:p="http://schemas.openxmlformats.org/presentationml/2006/main">
+  <p:cSld>
+    <p:spTree>
+      <p:nvGrpSpPr>
+        <p:cNvPr id="1" name=""/>
+        <p:cNvGrpSpPr/>
+        <p:nvPr/>
+      </p:nvGrpSpPr>
+      <p:grpSpPr>
+        <a:xfrm>
+          <a:off x="0" y="0"/>
+          <a:ext cx="0" cy="0"/>
+          <a:chOff x="0" y="0"/>
+          <a:chExt cx="0" cy="0"/>
+        </a:xfrm>
+      </p:grpSpPr>
+      <p:pic>
+        <p:nvPicPr>
+          <p:cNvPr id="4" name="Picture 3">
+            <a:extLst>
+              <a:ext uri="{FF2B5EF4-FFF2-40B4-BE49-F238E27FC236}">
+                <a16:creationId xmlns:a16="http://schemas.microsoft.com/office/drawing/2014/main" id="{C9A00391-1061-47F4-ABF9-22D63C3C2F53}"/>
+              </a:ext>
+            </a:extLst>
+          </p:cNvPr>
+          <p:cNvPicPr>
+            <a:picLocks noChangeAspect="1"/>
+          </p:cNvPicPr>
+          <p:nvPr/>
+        </p:nvPicPr>
+        <p:blipFill>
+          <a:blip r:embed="rId2"/>
+          <a:stretch>
+            <a:fillRect/>
+          </a:stretch>
+        </p:blipFill>
+        <p:spPr>
+          <a:xfrm>
+            <a:off x="3716666" y="1513939"/>
+            <a:ext cx="4970133" cy="5102618"/>
+          </a:xfrm>
+          <a:prstGeom prst="rect">
+            <a:avLst/>
+          </a:prstGeom>
+        </p:spPr>
+      </p:pic>
+      <p:sp>
+        <p:nvSpPr>
+          <p:cNvPr id="3" name="Content Placeholder 2">
+            <a:extLst>
+              <a:ext uri="{FF2B5EF4-FFF2-40B4-BE49-F238E27FC236}">
+                <a16:creationId xmlns:a16="http://schemas.microsoft.com/office/drawing/2014/main" id="{F7D57EB4-03F4-48DA-9B5D-2683D5BA1784}"/>
+              </a:ext>
+            </a:extLst>
+          </p:cNvPr>
+          <p:cNvSpPr>
+            <a:spLocks noGrp="1"/>
+          </p:cNvSpPr>
+          <p:nvPr>
+            <p:ph idx="1"/>
+          </p:nvPr>
+        </p:nvSpPr>
+        <p:spPr>
+          <a:xfrm>
+            <a:off x="570216" y="926635"/>
+            <a:ext cx="11106363" cy="5515261"/>
+          </a:xfrm>
+        </p:spPr>
+        <p:txBody>
+          <a:bodyPr>
+            <a:normAutofit/>
+          </a:bodyPr>
+          <a:lstStyle/>
+          <a:p>
+            <a:pPr marL="457200" indent="-457200" algn="r" rtl="1">
+              <a:lnSpc>
+                <a:spcPct val="100000"/>
+              </a:lnSpc>
+              <a:spcAft>
+                <a:spcPts val="1200"/>
+              </a:spcAft>
+              <a:buFont typeface="+mj-lt"/>
+              <a:buAutoNum type="arabicPeriod" startAt="2"/>
+            </a:pPr>
+            <a:r>
+              <a:rPr lang="ar-SY" sz="2400" b="1" dirty="0">
+                <a:solidFill>
+                  <a:srgbClr val="FF0000"/>
+                </a:solidFill>
+                <a:latin typeface="Arial" panose="020B0604020202020204" pitchFamily="34" charset="0"/>
+              </a:rPr>
+              <a:t>دارة القيادة ذات العزل الضوئي/الراديوي المستقلة </a:t>
+            </a:r>
+            <a:r>
+              <a:rPr lang="en-US" sz="2400" b="1" dirty="0">
+                <a:solidFill>
+                  <a:srgbClr val="FF0000"/>
+                </a:solidFill>
+                <a:latin typeface="Arial" panose="020B0604020202020204" pitchFamily="34" charset="0"/>
+              </a:rPr>
+              <a:t>Opto-Isolation/RF Isolation plus independent driver</a:t>
+            </a:r>
+          </a:p>
+        </p:txBody>
+      </p:sp>
+      <p:sp>
+        <p:nvSpPr>
+          <p:cNvPr id="2" name="Title 1">
+            <a:extLst>
+              <a:ext uri="{FF2B5EF4-FFF2-40B4-BE49-F238E27FC236}">
+                <a16:creationId xmlns:a16="http://schemas.microsoft.com/office/drawing/2014/main" id="{D6F7A68E-9C7F-4E94-92BE-304A8776DF03}"/>
+              </a:ext>
+            </a:extLst>
+          </p:cNvPr>
+          <p:cNvSpPr>
+            <a:spLocks noGrp="1"/>
+          </p:cNvSpPr>
+          <p:nvPr>
+            <p:ph type="title"/>
+          </p:nvPr>
+        </p:nvSpPr>
+        <p:spPr>
+          <a:xfrm>
+            <a:off x="838200" y="1"/>
+            <a:ext cx="10515600" cy="791109"/>
+          </a:xfrm>
+        </p:spPr>
+        <p:txBody>
+          <a:bodyPr>
+            <a:normAutofit/>
+          </a:bodyPr>
+          <a:lstStyle/>
+          <a:p>
+            <a:pPr algn="ctr" rtl="1"/>
+            <a:r>
+              <a:rPr lang="ar-SY" sz="3600" b="1" dirty="0">
+                <a:solidFill>
+                  <a:srgbClr val="FF0000"/>
+                </a:solidFill>
+                <a:cs typeface="+mn-cs"/>
+              </a:rPr>
+              <a:t>تصميم دارة قيادة البوابة </a:t>
+            </a:r>
+            <a:r>
+              <a:rPr lang="en-US" sz="3600" b="1" dirty="0">
+                <a:solidFill>
+                  <a:srgbClr val="FF0000"/>
+                </a:solidFill>
+                <a:cs typeface="+mn-cs"/>
+              </a:rPr>
+              <a:t>Gate Drive Schematic</a:t>
+            </a:r>
+          </a:p>
+        </p:txBody>
+      </p:sp>
+    </p:spTree>
+    <p:extLst>
+      <p:ext uri="{BB962C8B-B14F-4D97-AF65-F5344CB8AC3E}">
+        <p14:creationId xmlns:p14="http://schemas.microsoft.com/office/powerpoint/2010/main" val="1012963643"/>
+      </p:ext>
+    </p:extLst>
+  </p:cSld>
+  <p:clrMapOvr>
+    <a:masterClrMapping/>
+  </p:clrMapOvr>
+</p:sld>
+</file>
+
+<file path=ppt/slides/slide9.xml><?xml version="1.0" encoding="utf-8"?>
+<p:sld xmlns:a="http://schemas.openxmlformats.org/drawingml/2006/main" xmlns:r="http://schemas.openxmlformats.org/officeDocument/2006/relationships" xmlns:p="http://schemas.openxmlformats.org/presentationml/2006/main">
+  <p:cSld>
+    <p:spTree>
+      <p:nvGrpSpPr>
+        <p:cNvPr id="1" name=""/>
+        <p:cNvGrpSpPr/>
+        <p:nvPr/>
+      </p:nvGrpSpPr>
+      <p:grpSpPr>
+        <a:xfrm>
+          <a:off x="0" y="0"/>
+          <a:ext cx="0" cy="0"/>
+          <a:chOff x="0" y="0"/>
+          <a:chExt cx="0" cy="0"/>
+        </a:xfrm>
+      </p:grpSpPr>
+      <p:sp>
+        <p:nvSpPr>
+          <p:cNvPr id="3" name="Content Placeholder 2">
+            <a:extLst>
+              <a:ext uri="{FF2B5EF4-FFF2-40B4-BE49-F238E27FC236}">
+                <a16:creationId xmlns:a16="http://schemas.microsoft.com/office/drawing/2014/main" id="{F7D57EB4-03F4-48DA-9B5D-2683D5BA1784}"/>
+              </a:ext>
+            </a:extLst>
+          </p:cNvPr>
+          <p:cNvSpPr>
+            <a:spLocks noGrp="1"/>
+          </p:cNvSpPr>
+          <p:nvPr>
+            <p:ph idx="1"/>
+          </p:nvPr>
+        </p:nvSpPr>
+        <p:spPr>
+          <a:xfrm>
+            <a:off x="570216" y="926635"/>
+            <a:ext cx="11106363" cy="5515261"/>
+          </a:xfrm>
+        </p:spPr>
+        <p:txBody>
+          <a:bodyPr>
+            <a:normAutofit/>
+          </a:bodyPr>
+          <a:lstStyle/>
+          <a:p>
+            <a:pPr marL="457200" indent="-457200" algn="r" rtl="1">
+              <a:lnSpc>
+                <a:spcPct val="100000"/>
+              </a:lnSpc>
+              <a:spcAft>
+                <a:spcPts val="1200"/>
+              </a:spcAft>
+              <a:buFont typeface="+mj-lt"/>
+              <a:buAutoNum type="arabicPeriod" startAt="2"/>
+            </a:pPr>
+            <a:r>
+              <a:rPr lang="ar-SY" sz="2400" b="1" dirty="0">
+                <a:solidFill>
+                  <a:srgbClr val="FF0000"/>
+                </a:solidFill>
+                <a:latin typeface="Arial" panose="020B0604020202020204" pitchFamily="34" charset="0"/>
+              </a:rPr>
+              <a:t>دارة القيادة ذات العزل الضوئي/الراديوي المستقلة </a:t>
+            </a:r>
+            <a:r>
+              <a:rPr lang="en-US" sz="2400" b="1" dirty="0">
+                <a:solidFill>
+                  <a:srgbClr val="FF0000"/>
+                </a:solidFill>
+                <a:latin typeface="Arial" panose="020B0604020202020204" pitchFamily="34" charset="0"/>
+              </a:rPr>
+              <a:t>Opto-Isolation/RF Isolation plus independent driver</a:t>
+            </a:r>
+          </a:p>
+        </p:txBody>
+      </p:sp>
+      <p:sp>
+        <p:nvSpPr>
+          <p:cNvPr id="2" name="Title 1">
+            <a:extLst>
+              <a:ext uri="{FF2B5EF4-FFF2-40B4-BE49-F238E27FC236}">
+                <a16:creationId xmlns:a16="http://schemas.microsoft.com/office/drawing/2014/main" id="{D6F7A68E-9C7F-4E94-92BE-304A8776DF03}"/>
+              </a:ext>
+            </a:extLst>
+          </p:cNvPr>
+          <p:cNvSpPr>
+            <a:spLocks noGrp="1"/>
+          </p:cNvSpPr>
+          <p:nvPr>
+            <p:ph type="title"/>
+          </p:nvPr>
+        </p:nvSpPr>
+        <p:spPr>
+          <a:xfrm>
+            <a:off x="838200" y="1"/>
+            <a:ext cx="10515600" cy="791109"/>
+          </a:xfrm>
+        </p:spPr>
+        <p:txBody>
+          <a:bodyPr>
+            <a:normAutofit/>
+          </a:bodyPr>
+          <a:lstStyle/>
+          <a:p>
+            <a:pPr algn="ctr" rtl="1"/>
+            <a:r>
+              <a:rPr lang="ar-SY" sz="3600" b="1" dirty="0">
+                <a:solidFill>
+                  <a:srgbClr val="FF0000"/>
+                </a:solidFill>
+                <a:cs typeface="+mn-cs"/>
+              </a:rPr>
+              <a:t>تصميم دارة قيادة البوابة </a:t>
+            </a:r>
+            <a:r>
+              <a:rPr lang="en-US" sz="3600" b="1" dirty="0">
+                <a:solidFill>
+                  <a:srgbClr val="FF0000"/>
+                </a:solidFill>
+                <a:cs typeface="+mn-cs"/>
+              </a:rPr>
+              <a:t>Gate Drive Schematic</a:t>
+            </a:r>
+          </a:p>
+        </p:txBody>
+      </p:sp>
+      <p:pic>
+        <p:nvPicPr>
+          <p:cNvPr id="6" name="Picture 5">
+            <a:extLst>
+              <a:ext uri="{FF2B5EF4-FFF2-40B4-BE49-F238E27FC236}">
+                <a16:creationId xmlns:a16="http://schemas.microsoft.com/office/drawing/2014/main" id="{6C8DCFAC-7BC6-407B-9D5E-317466C50A38}"/>
+              </a:ext>
+            </a:extLst>
+          </p:cNvPr>
+          <p:cNvPicPr>
+            <a:picLocks noChangeAspect="1"/>
+          </p:cNvPicPr>
+          <p:nvPr/>
+        </p:nvPicPr>
+        <p:blipFill>
+          <a:blip r:embed="rId2"/>
+          <a:stretch>
+            <a:fillRect/>
+          </a:stretch>
+        </p:blipFill>
+        <p:spPr>
+          <a:xfrm>
+            <a:off x="6421550" y="2166721"/>
+            <a:ext cx="5064958" cy="4192982"/>
+          </a:xfrm>
+          <a:prstGeom prst="rect">
+            <a:avLst/>
+          </a:prstGeom>
+        </p:spPr>
+      </p:pic>
+      <p:pic>
+        <p:nvPicPr>
+          <p:cNvPr id="7" name="Picture 6">
+            <a:extLst>
+              <a:ext uri="{FF2B5EF4-FFF2-40B4-BE49-F238E27FC236}">
+                <a16:creationId xmlns:a16="http://schemas.microsoft.com/office/drawing/2014/main" id="{A7397680-CACE-4554-A8A8-4B754179D8C1}"/>
+              </a:ext>
+            </a:extLst>
+          </p:cNvPr>
+          <p:cNvPicPr>
+            <a:picLocks noChangeAspect="1"/>
+          </p:cNvPicPr>
+          <p:nvPr/>
+        </p:nvPicPr>
+        <p:blipFill>
+          <a:blip r:embed="rId3"/>
+          <a:stretch>
+            <a:fillRect/>
+          </a:stretch>
+        </p:blipFill>
+        <p:spPr>
+          <a:xfrm>
+            <a:off x="705492" y="1963983"/>
+            <a:ext cx="5128706" cy="4734768"/>
+          </a:xfrm>
+          <a:prstGeom prst="rect">
+            <a:avLst/>
+          </a:prstGeom>
+        </p:spPr>
+      </p:pic>
+      <p:sp>
+        <p:nvSpPr>
+          <p:cNvPr id="8" name="Rectangle 7">
+            <a:extLst>
+              <a:ext uri="{FF2B5EF4-FFF2-40B4-BE49-F238E27FC236}">
+                <a16:creationId xmlns:a16="http://schemas.microsoft.com/office/drawing/2014/main" id="{459277CF-DF0B-4F6E-9DB3-37AA50B8C56B}"/>
+              </a:ext>
+            </a:extLst>
+          </p:cNvPr>
+          <p:cNvSpPr/>
+          <p:nvPr/>
+        </p:nvSpPr>
+        <p:spPr>
+          <a:xfrm>
+            <a:off x="9852917" y="5512085"/>
+            <a:ext cx="1232899" cy="739740"/>
+          </a:xfrm>
+          <a:prstGeom prst="rect">
+            <a:avLst/>
+          </a:prstGeom>
+          <a:noFill/>
+          <a:ln w="19050">
+            <a:solidFill>
+              <a:srgbClr val="FF0000"/>
+            </a:solidFill>
+          </a:ln>
+        </p:spPr>
+        <p:style>
+          <a:lnRef idx="2">
+            <a:schemeClr val="accent1">
+              <a:shade val="50000"/>
+            </a:schemeClr>
+          </a:lnRef>
+          <a:fillRef idx="1">
+            <a:schemeClr val="accent1"/>
+          </a:fillRef>
+          <a:effectRef idx="0">
+            <a:schemeClr val="accent1"/>
+          </a:effectRef>
+          <a:fontRef idx="minor">
+            <a:schemeClr val="lt1"/>
+          </a:fontRef>
+        </p:style>
+        <p:txBody>
+          <a:bodyPr rtlCol="0" anchor="ctr"/>
+          <a:lstStyle/>
+          <a:p>
+            <a:pPr algn="ctr"/>
+            <a:endParaRPr lang="en-US"/>
+          </a:p>
+        </p:txBody>
+      </p:sp>
+      <p:sp>
+        <p:nvSpPr>
+          <p:cNvPr id="9" name="Rectangle 8">
+            <a:extLst>
+              <a:ext uri="{FF2B5EF4-FFF2-40B4-BE49-F238E27FC236}">
+                <a16:creationId xmlns:a16="http://schemas.microsoft.com/office/drawing/2014/main" id="{294D702F-2FC5-4410-B23C-CE1629C544FD}"/>
+              </a:ext>
+            </a:extLst>
+          </p:cNvPr>
+          <p:cNvSpPr/>
+          <p:nvPr/>
+        </p:nvSpPr>
+        <p:spPr>
+          <a:xfrm>
+            <a:off x="1106184" y="5327150"/>
+            <a:ext cx="1868185" cy="323637"/>
+          </a:xfrm>
+          <a:prstGeom prst="rect">
+            <a:avLst/>
+          </a:prstGeom>
+          <a:noFill/>
+          <a:ln w="19050">
+            <a:solidFill>
+              <a:srgbClr val="FF0000"/>
+            </a:solidFill>
+          </a:ln>
+        </p:spPr>
+        <p:style>
+          <a:lnRef idx="2">
+            <a:schemeClr val="accent1">
+              <a:shade val="50000"/>
+            </a:schemeClr>
+          </a:lnRef>
+          <a:fillRef idx="1">
+            <a:schemeClr val="accent1"/>
+          </a:fillRef>
+          <a:effectRef idx="0">
+            <a:schemeClr val="accent1"/>
+          </a:effectRef>
+          <a:fontRef idx="minor">
+            <a:schemeClr val="lt1"/>
+          </a:fontRef>
+        </p:style>
+        <p:txBody>
+          <a:bodyPr rtlCol="0" anchor="ctr"/>
+          <a:lstStyle/>
+          <a:p>
+            <a:pPr algn="ctr"/>
+            <a:endParaRPr lang="en-US"/>
+          </a:p>
+        </p:txBody>
+      </p:sp>
+    </p:spTree>
+    <p:extLst>
+      <p:ext uri="{BB962C8B-B14F-4D97-AF65-F5344CB8AC3E}">
+        <p14:creationId xmlns:p14="http://schemas.microsoft.com/office/powerpoint/2010/main" val="1558603682"/>
       </p:ext>
     </p:extLst>
   </p:cSld>

</xml_diff>